<commit_message>
think i fixed it
</commit_message>
<xml_diff>
--- a/DNA_Project_Presentation.pptx
+++ b/DNA_Project_Presentation.pptx
@@ -119,6 +119,11 @@
       </a:defRPr>
     </a:lvl9pPr>
   </p:defaultTextStyle>
+  <p:extLst>
+    <p:ext uri="{EFAFB233-063F-42B5-8137-9DF3F51BA10A}">
+      <p15:sldGuideLst xmlns:p15="http://schemas.microsoft.com/office/powerpoint/2012/main"/>
+    </p:ext>
+  </p:extLst>
 </p:presentation>
 </file>
 
@@ -22846,7 +22851,7 @@
           <a:p>
             <a:fld id="{319607F6-B9B2-E646-9045-EBA9AEC4E88C}" type="datetimeFigureOut">
               <a:rPr lang="en-US" smtClean="0"/>
-              <a:t>4/10/23</a:t>
+              <a:t>4/13/23</a:t>
             </a:fld>
             <a:endParaRPr lang="en-US"/>
           </a:p>
@@ -23044,7 +23049,7 @@
           <a:p>
             <a:fld id="{319607F6-B9B2-E646-9045-EBA9AEC4E88C}" type="datetimeFigureOut">
               <a:rPr lang="en-US" smtClean="0"/>
-              <a:t>4/10/23</a:t>
+              <a:t>4/13/23</a:t>
             </a:fld>
             <a:endParaRPr lang="en-US"/>
           </a:p>
@@ -23252,7 +23257,7 @@
           <a:p>
             <a:fld id="{319607F6-B9B2-E646-9045-EBA9AEC4E88C}" type="datetimeFigureOut">
               <a:rPr lang="en-US" smtClean="0"/>
-              <a:t>4/10/23</a:t>
+              <a:t>4/13/23</a:t>
             </a:fld>
             <a:endParaRPr lang="en-US"/>
           </a:p>
@@ -23450,7 +23455,7 @@
           <a:p>
             <a:fld id="{319607F6-B9B2-E646-9045-EBA9AEC4E88C}" type="datetimeFigureOut">
               <a:rPr lang="en-US" smtClean="0"/>
-              <a:t>4/10/23</a:t>
+              <a:t>4/13/23</a:t>
             </a:fld>
             <a:endParaRPr lang="en-US"/>
           </a:p>
@@ -23725,7 +23730,7 @@
           <a:p>
             <a:fld id="{319607F6-B9B2-E646-9045-EBA9AEC4E88C}" type="datetimeFigureOut">
               <a:rPr lang="en-US" smtClean="0"/>
-              <a:t>4/10/23</a:t>
+              <a:t>4/13/23</a:t>
             </a:fld>
             <a:endParaRPr lang="en-US"/>
           </a:p>
@@ -23990,7 +23995,7 @@
           <a:p>
             <a:fld id="{319607F6-B9B2-E646-9045-EBA9AEC4E88C}" type="datetimeFigureOut">
               <a:rPr lang="en-US" smtClean="0"/>
-              <a:t>4/10/23</a:t>
+              <a:t>4/13/23</a:t>
             </a:fld>
             <a:endParaRPr lang="en-US"/>
           </a:p>
@@ -24402,7 +24407,7 @@
           <a:p>
             <a:fld id="{319607F6-B9B2-E646-9045-EBA9AEC4E88C}" type="datetimeFigureOut">
               <a:rPr lang="en-US" smtClean="0"/>
-              <a:t>4/10/23</a:t>
+              <a:t>4/13/23</a:t>
             </a:fld>
             <a:endParaRPr lang="en-US"/>
           </a:p>
@@ -24543,7 +24548,7 @@
           <a:p>
             <a:fld id="{319607F6-B9B2-E646-9045-EBA9AEC4E88C}" type="datetimeFigureOut">
               <a:rPr lang="en-US" smtClean="0"/>
-              <a:t>4/10/23</a:t>
+              <a:t>4/13/23</a:t>
             </a:fld>
             <a:endParaRPr lang="en-US"/>
           </a:p>
@@ -24656,7 +24661,7 @@
           <a:p>
             <a:fld id="{319607F6-B9B2-E646-9045-EBA9AEC4E88C}" type="datetimeFigureOut">
               <a:rPr lang="en-US" smtClean="0"/>
-              <a:t>4/10/23</a:t>
+              <a:t>4/13/23</a:t>
             </a:fld>
             <a:endParaRPr lang="en-US"/>
           </a:p>
@@ -24967,7 +24972,7 @@
           <a:p>
             <a:fld id="{319607F6-B9B2-E646-9045-EBA9AEC4E88C}" type="datetimeFigureOut">
               <a:rPr lang="en-US" smtClean="0"/>
-              <a:t>4/10/23</a:t>
+              <a:t>4/13/23</a:t>
             </a:fld>
             <a:endParaRPr lang="en-US"/>
           </a:p>
@@ -25255,7 +25260,7 @@
           <a:p>
             <a:fld id="{319607F6-B9B2-E646-9045-EBA9AEC4E88C}" type="datetimeFigureOut">
               <a:rPr lang="en-US" smtClean="0"/>
-              <a:t>4/10/23</a:t>
+              <a:t>4/13/23</a:t>
             </a:fld>
             <a:endParaRPr lang="en-US"/>
           </a:p>
@@ -25496,7 +25501,7 @@
           <a:p>
             <a:fld id="{319607F6-B9B2-E646-9045-EBA9AEC4E88C}" type="datetimeFigureOut">
               <a:rPr lang="en-US" smtClean="0"/>
-              <a:t>4/10/23</a:t>
+              <a:t>4/13/23</a:t>
             </a:fld>
             <a:endParaRPr lang="en-US"/>
           </a:p>
@@ -28410,10 +28415,10 @@
       </p:grpSpPr>
       <p:sp useBgFill="1">
         <p:nvSpPr>
-          <p:cNvPr id="15" name="Rectangle 11">
+          <p:cNvPr id="20" name="Rectangle 19">
             <a:extLst>
               <a:ext uri="{FF2B5EF4-FFF2-40B4-BE49-F238E27FC236}">
-                <a16:creationId xmlns:a16="http://schemas.microsoft.com/office/drawing/2014/main" id="{32AEEBC8-9D30-42EF-95F2-386C2653FBF0}"/>
+                <a16:creationId xmlns:a16="http://schemas.microsoft.com/office/drawing/2014/main" id="{66E48AFA-8884-4F68-A44F-D2C1E8609C5A}"/>
               </a:ext>
               <a:ext uri="{C183D7F6-B498-43B3-948B-1728B52AA6E4}">
                 <adec:decorative xmlns:adec="http://schemas.microsoft.com/office/drawing/2017/decorative" val="1"/>
@@ -28431,7 +28436,7 @@
             </p:extLst>
           </p:nvPr>
         </p:nvSpPr>
-        <p:spPr>
+        <p:spPr bwMode="white">
           <a:xfrm>
             <a:off x="0" y="0"/>
             <a:ext cx="12192000" cy="6858000"/>
@@ -28461,7 +28466,101 @@
         </p:style>
         <p:txBody>
           <a:bodyPr rtlCol="0" anchor="ctr"/>
-          <a:lstStyle/>
+          <a:lstStyle>
+            <a:defPPr>
+              <a:defRPr lang="en-US"/>
+            </a:defPPr>
+            <a:lvl1pPr marL="0" algn="l" defTabSz="914400" rtl="0" eaLnBrk="1" latinLnBrk="0" hangingPunct="1">
+              <a:defRPr sz="1800" kern="1200">
+                <a:solidFill>
+                  <a:schemeClr val="lt1"/>
+                </a:solidFill>
+                <a:latin typeface="+mn-lt"/>
+                <a:ea typeface="+mn-ea"/>
+                <a:cs typeface="+mn-cs"/>
+              </a:defRPr>
+            </a:lvl1pPr>
+            <a:lvl2pPr marL="457200" algn="l" defTabSz="914400" rtl="0" eaLnBrk="1" latinLnBrk="0" hangingPunct="1">
+              <a:defRPr sz="1800" kern="1200">
+                <a:solidFill>
+                  <a:schemeClr val="lt1"/>
+                </a:solidFill>
+                <a:latin typeface="+mn-lt"/>
+                <a:ea typeface="+mn-ea"/>
+                <a:cs typeface="+mn-cs"/>
+              </a:defRPr>
+            </a:lvl2pPr>
+            <a:lvl3pPr marL="914400" algn="l" defTabSz="914400" rtl="0" eaLnBrk="1" latinLnBrk="0" hangingPunct="1">
+              <a:defRPr sz="1800" kern="1200">
+                <a:solidFill>
+                  <a:schemeClr val="lt1"/>
+                </a:solidFill>
+                <a:latin typeface="+mn-lt"/>
+                <a:ea typeface="+mn-ea"/>
+                <a:cs typeface="+mn-cs"/>
+              </a:defRPr>
+            </a:lvl3pPr>
+            <a:lvl4pPr marL="1371600" algn="l" defTabSz="914400" rtl="0" eaLnBrk="1" latinLnBrk="0" hangingPunct="1">
+              <a:defRPr sz="1800" kern="1200">
+                <a:solidFill>
+                  <a:schemeClr val="lt1"/>
+                </a:solidFill>
+                <a:latin typeface="+mn-lt"/>
+                <a:ea typeface="+mn-ea"/>
+                <a:cs typeface="+mn-cs"/>
+              </a:defRPr>
+            </a:lvl4pPr>
+            <a:lvl5pPr marL="1828800" algn="l" defTabSz="914400" rtl="0" eaLnBrk="1" latinLnBrk="0" hangingPunct="1">
+              <a:defRPr sz="1800" kern="1200">
+                <a:solidFill>
+                  <a:schemeClr val="lt1"/>
+                </a:solidFill>
+                <a:latin typeface="+mn-lt"/>
+                <a:ea typeface="+mn-ea"/>
+                <a:cs typeface="+mn-cs"/>
+              </a:defRPr>
+            </a:lvl5pPr>
+            <a:lvl6pPr marL="2286000" algn="l" defTabSz="914400" rtl="0" eaLnBrk="1" latinLnBrk="0" hangingPunct="1">
+              <a:defRPr sz="1800" kern="1200">
+                <a:solidFill>
+                  <a:schemeClr val="lt1"/>
+                </a:solidFill>
+                <a:latin typeface="+mn-lt"/>
+                <a:ea typeface="+mn-ea"/>
+                <a:cs typeface="+mn-cs"/>
+              </a:defRPr>
+            </a:lvl6pPr>
+            <a:lvl7pPr marL="2743200" algn="l" defTabSz="914400" rtl="0" eaLnBrk="1" latinLnBrk="0" hangingPunct="1">
+              <a:defRPr sz="1800" kern="1200">
+                <a:solidFill>
+                  <a:schemeClr val="lt1"/>
+                </a:solidFill>
+                <a:latin typeface="+mn-lt"/>
+                <a:ea typeface="+mn-ea"/>
+                <a:cs typeface="+mn-cs"/>
+              </a:defRPr>
+            </a:lvl7pPr>
+            <a:lvl8pPr marL="3200400" algn="l" defTabSz="914400" rtl="0" eaLnBrk="1" latinLnBrk="0" hangingPunct="1">
+              <a:defRPr sz="1800" kern="1200">
+                <a:solidFill>
+                  <a:schemeClr val="lt1"/>
+                </a:solidFill>
+                <a:latin typeface="+mn-lt"/>
+                <a:ea typeface="+mn-ea"/>
+                <a:cs typeface="+mn-cs"/>
+              </a:defRPr>
+            </a:lvl8pPr>
+            <a:lvl9pPr marL="3657600" algn="l" defTabSz="914400" rtl="0" eaLnBrk="1" latinLnBrk="0" hangingPunct="1">
+              <a:defRPr sz="1800" kern="1200">
+                <a:solidFill>
+                  <a:schemeClr val="lt1"/>
+                </a:solidFill>
+                <a:latin typeface="+mn-lt"/>
+                <a:ea typeface="+mn-ea"/>
+                <a:cs typeface="+mn-cs"/>
+              </a:defRPr>
+            </a:lvl9pPr>
+          </a:lstStyle>
           <a:p>
             <a:pPr algn="ctr"/>
             <a:endParaRPr lang="en-US"/>
@@ -28486,18 +28585,18 @@
         </p:nvSpPr>
         <p:spPr>
           <a:xfrm>
-            <a:off x="630936" y="502920"/>
-            <a:ext cx="3419856" cy="1463040"/>
+            <a:off x="838201" y="3998018"/>
+            <a:ext cx="3981854" cy="2216513"/>
           </a:xfrm>
         </p:spPr>
         <p:txBody>
-          <a:bodyPr anchor="ctr">
+          <a:bodyPr>
             <a:normAutofit/>
           </a:bodyPr>
           <a:lstStyle/>
           <a:p>
             <a:r>
-              <a:rPr lang="en-US" sz="4800"/>
+              <a:rPr lang="en-US"/>
               <a:t>Preliminary Results</a:t>
             </a:r>
           </a:p>
@@ -28505,10 +28604,10 @@
       </p:sp>
       <p:sp>
         <p:nvSpPr>
-          <p:cNvPr id="14" name="sketch line">
+          <p:cNvPr id="22" name="Arc 21">
             <a:extLst>
               <a:ext uri="{FF2B5EF4-FFF2-40B4-BE49-F238E27FC236}">
-                <a16:creationId xmlns:a16="http://schemas.microsoft.com/office/drawing/2014/main" id="{2E92FA66-67D7-4CB4-94D3-E643A9AD4757}"/>
+                <a16:creationId xmlns:a16="http://schemas.microsoft.com/office/drawing/2014/main" id="{969D19A6-08CB-498C-93EC-3FFB021FC68A}"/>
               </a:ext>
               <a:ext uri="{C183D7F6-B498-43B3-948B-1728B52AA6E4}">
                 <adec:decorative xmlns:adec="http://schemas.microsoft.com/office/drawing/2017/decorative" val="1"/>
@@ -28527,205 +28626,148 @@
           </p:nvPr>
         </p:nvSpPr>
         <p:spPr>
-          <a:xfrm rot="5400000">
-            <a:off x="3566159" y="1225296"/>
-            <a:ext cx="1554480" cy="18288"/>
+          <a:xfrm rot="6269068">
+            <a:off x="8717845" y="3339275"/>
+            <a:ext cx="2987899" cy="2987899"/>
           </a:xfrm>
-          <a:custGeom>
-            <a:avLst/>
-            <a:gdLst>
-              <a:gd name="connsiteX0" fmla="*/ 0 w 1554480"/>
-              <a:gd name="connsiteY0" fmla="*/ 0 h 18288"/>
-              <a:gd name="connsiteX1" fmla="*/ 549250 w 1554480"/>
-              <a:gd name="connsiteY1" fmla="*/ 0 h 18288"/>
-              <a:gd name="connsiteX2" fmla="*/ 1082954 w 1554480"/>
-              <a:gd name="connsiteY2" fmla="*/ 0 h 18288"/>
-              <a:gd name="connsiteX3" fmla="*/ 1554480 w 1554480"/>
-              <a:gd name="connsiteY3" fmla="*/ 0 h 18288"/>
-              <a:gd name="connsiteX4" fmla="*/ 1554480 w 1554480"/>
-              <a:gd name="connsiteY4" fmla="*/ 18288 h 18288"/>
-              <a:gd name="connsiteX5" fmla="*/ 1067410 w 1554480"/>
-              <a:gd name="connsiteY5" fmla="*/ 18288 h 18288"/>
-              <a:gd name="connsiteX6" fmla="*/ 549250 w 1554480"/>
-              <a:gd name="connsiteY6" fmla="*/ 18288 h 18288"/>
-              <a:gd name="connsiteX7" fmla="*/ 0 w 1554480"/>
-              <a:gd name="connsiteY7" fmla="*/ 18288 h 18288"/>
-              <a:gd name="connsiteX8" fmla="*/ 0 w 1554480"/>
-              <a:gd name="connsiteY8" fmla="*/ 0 h 18288"/>
-            </a:gdLst>
-            <a:ahLst/>
-            <a:cxnLst>
-              <a:cxn ang="0">
-                <a:pos x="connsiteX0" y="connsiteY0"/>
-              </a:cxn>
-              <a:cxn ang="0">
-                <a:pos x="connsiteX1" y="connsiteY1"/>
-              </a:cxn>
-              <a:cxn ang="0">
-                <a:pos x="connsiteX2" y="connsiteY2"/>
-              </a:cxn>
-              <a:cxn ang="0">
-                <a:pos x="connsiteX3" y="connsiteY3"/>
-              </a:cxn>
-              <a:cxn ang="0">
-                <a:pos x="connsiteX4" y="connsiteY4"/>
-              </a:cxn>
-              <a:cxn ang="0">
-                <a:pos x="connsiteX5" y="connsiteY5"/>
-              </a:cxn>
-              <a:cxn ang="0">
-                <a:pos x="connsiteX6" y="connsiteY6"/>
-              </a:cxn>
-              <a:cxn ang="0">
-                <a:pos x="connsiteX7" y="connsiteY7"/>
-              </a:cxn>
-              <a:cxn ang="0">
-                <a:pos x="connsiteX8" y="connsiteY8"/>
-              </a:cxn>
-            </a:cxnLst>
-            <a:rect l="l" t="t" r="r" b="b"/>
-            <a:pathLst>
-              <a:path w="1554480" h="18288" fill="none" extrusionOk="0">
-                <a:moveTo>
-                  <a:pt x="0" y="0"/>
-                </a:moveTo>
-                <a:cubicBezTo>
-                  <a:pt x="114141" y="-19864"/>
-                  <a:pt x="345055" y="-1657"/>
-                  <a:pt x="549250" y="0"/>
-                </a:cubicBezTo>
-                <a:cubicBezTo>
-                  <a:pt x="753445" y="1657"/>
-                  <a:pt x="862292" y="-5674"/>
-                  <a:pt x="1082954" y="0"/>
-                </a:cubicBezTo>
-                <a:cubicBezTo>
-                  <a:pt x="1303616" y="5674"/>
-                  <a:pt x="1363530" y="4537"/>
-                  <a:pt x="1554480" y="0"/>
-                </a:cubicBezTo>
-                <a:cubicBezTo>
-                  <a:pt x="1554963" y="7176"/>
-                  <a:pt x="1553909" y="13682"/>
-                  <a:pt x="1554480" y="18288"/>
-                </a:cubicBezTo>
-                <a:cubicBezTo>
-                  <a:pt x="1338847" y="6127"/>
-                  <a:pt x="1215066" y="37851"/>
-                  <a:pt x="1067410" y="18288"/>
-                </a:cubicBezTo>
-                <a:cubicBezTo>
-                  <a:pt x="919754" y="-1275"/>
-                  <a:pt x="800465" y="3080"/>
-                  <a:pt x="549250" y="18288"/>
-                </a:cubicBezTo>
-                <a:cubicBezTo>
-                  <a:pt x="298035" y="33496"/>
-                  <a:pt x="158868" y="22769"/>
-                  <a:pt x="0" y="18288"/>
-                </a:cubicBezTo>
-                <a:cubicBezTo>
-                  <a:pt x="-655" y="13237"/>
-                  <a:pt x="709" y="4645"/>
-                  <a:pt x="0" y="0"/>
-                </a:cubicBezTo>
-                <a:close/>
-              </a:path>
-              <a:path w="1554480" h="18288" stroke="0" extrusionOk="0">
-                <a:moveTo>
-                  <a:pt x="0" y="0"/>
-                </a:moveTo>
-                <a:cubicBezTo>
-                  <a:pt x="249941" y="-58"/>
-                  <a:pt x="367334" y="23448"/>
-                  <a:pt x="502615" y="0"/>
-                </a:cubicBezTo>
-                <a:cubicBezTo>
-                  <a:pt x="637897" y="-23448"/>
-                  <a:pt x="813653" y="-20418"/>
-                  <a:pt x="974141" y="0"/>
-                </a:cubicBezTo>
-                <a:cubicBezTo>
-                  <a:pt x="1134629" y="20418"/>
-                  <a:pt x="1268772" y="6288"/>
-                  <a:pt x="1554480" y="0"/>
-                </a:cubicBezTo>
-                <a:cubicBezTo>
-                  <a:pt x="1554917" y="7222"/>
-                  <a:pt x="1555359" y="13299"/>
-                  <a:pt x="1554480" y="18288"/>
-                </a:cubicBezTo>
-                <a:cubicBezTo>
-                  <a:pt x="1336087" y="12172"/>
-                  <a:pt x="1310024" y="19759"/>
-                  <a:pt x="1067410" y="18288"/>
-                </a:cubicBezTo>
-                <a:cubicBezTo>
-                  <a:pt x="824796" y="16818"/>
-                  <a:pt x="787902" y="34647"/>
-                  <a:pt x="518160" y="18288"/>
-                </a:cubicBezTo>
-                <a:cubicBezTo>
-                  <a:pt x="248418" y="1930"/>
-                  <a:pt x="133160" y="9205"/>
-                  <a:pt x="0" y="18288"/>
-                </a:cubicBezTo>
-                <a:cubicBezTo>
-                  <a:pt x="-643" y="9451"/>
-                  <a:pt x="-340" y="7114"/>
-                  <a:pt x="0" y="0"/>
-                </a:cubicBezTo>
-                <a:close/>
-              </a:path>
-            </a:pathLst>
-          </a:custGeom>
-          <a:solidFill>
-            <a:schemeClr val="accent2"/>
-          </a:solidFill>
-          <a:ln w="41275" cap="rnd">
+          <a:prstGeom prst="arc">
+            <a:avLst>
+              <a:gd name="adj1" fmla="val 14441841"/>
+              <a:gd name="adj2" fmla="val 0"/>
+            </a:avLst>
+          </a:prstGeom>
+          <a:ln w="127000" cap="rnd">
             <a:solidFill>
-              <a:schemeClr val="accent2"/>
+              <a:schemeClr val="accent4"/>
             </a:solidFill>
-            <a:round/>
-            <a:extLst>
-              <a:ext uri="{C807C97D-BFC1-408E-A445-0C87EB9F89A2}">
-                <ask:lineSketchStyleProps xmlns:ask="http://schemas.microsoft.com/office/drawing/2018/sketchyshapes" sd="1219033472">
-                  <a:prstGeom prst="rect">
-                    <a:avLst/>
-                  </a:prstGeom>
-                  <ask:type>
-                    <ask:lineSketchFreehand/>
-                  </ask:type>
-                </ask:lineSketchStyleProps>
-              </a:ext>
-            </a:extLst>
+            <a:prstDash val="dash"/>
+            <a:miter lim="800000"/>
           </a:ln>
         </p:spPr>
         <p:style>
-          <a:lnRef idx="2">
-            <a:schemeClr val="accent1">
-              <a:shade val="50000"/>
-            </a:schemeClr>
+          <a:lnRef idx="1">
+            <a:schemeClr val="accent1"/>
           </a:lnRef>
-          <a:fillRef idx="1">
+          <a:fillRef idx="0">
             <a:schemeClr val="accent1"/>
           </a:fillRef>
           <a:effectRef idx="0">
             <a:schemeClr val="accent1"/>
           </a:effectRef>
           <a:fontRef idx="minor">
-            <a:schemeClr val="lt1"/>
+            <a:schemeClr val="tx1"/>
           </a:fontRef>
         </p:style>
         <p:txBody>
           <a:bodyPr rtlCol="0" anchor="ctr"/>
           <a:lstStyle/>
           <a:p>
-            <a:pPr algn="ctr"/>
-            <a:endParaRPr lang="en-US"/>
+            <a:pPr marL="0" marR="0" lvl="0" indent="0" algn="ctr" defTabSz="914400" rtl="0" eaLnBrk="1" fontAlgn="auto" latinLnBrk="0" hangingPunct="1">
+              <a:lnSpc>
+                <a:spcPct val="100000"/>
+              </a:lnSpc>
+              <a:spcBef>
+                <a:spcPts val="0"/>
+              </a:spcBef>
+              <a:spcAft>
+                <a:spcPts val="0"/>
+              </a:spcAft>
+              <a:buClrTx/>
+              <a:buSzTx/>
+              <a:buFontTx/>
+              <a:buNone/>
+              <a:tabLst/>
+              <a:defRPr/>
+            </a:pPr>
+            <a:endParaRPr kumimoji="0" lang="en-US" sz="1800" b="0" i="0" u="none" strike="noStrike" kern="1200" cap="none" spc="0" normalizeH="0" baseline="0" noProof="0">
+              <a:ln>
+                <a:noFill/>
+              </a:ln>
+              <a:solidFill>
+                <a:srgbClr val="000000"/>
+              </a:solidFill>
+              <a:effectLst/>
+              <a:uLnTx/>
+              <a:uFillTx/>
+              <a:latin typeface="Calibri" panose="020F0502020204030204"/>
+              <a:ea typeface="+mn-ea"/>
+              <a:cs typeface="+mn-cs"/>
+            </a:endParaRPr>
           </a:p>
         </p:txBody>
       </p:sp>
+      <p:pic>
+        <p:nvPicPr>
+          <p:cNvPr id="5" name="Content Placeholder 4">
+            <a:extLst>
+              <a:ext uri="{FF2B5EF4-FFF2-40B4-BE49-F238E27FC236}">
+                <a16:creationId xmlns:a16="http://schemas.microsoft.com/office/drawing/2014/main" id="{E35AA71B-3F83-D112-CF89-6169B6B9B45F}"/>
+              </a:ext>
+            </a:extLst>
+          </p:cNvPr>
+          <p:cNvPicPr>
+            <a:picLocks noChangeAspect="1"/>
+          </p:cNvPicPr>
+          <p:nvPr/>
+        </p:nvPicPr>
+        <p:blipFill>
+          <a:blip r:embed="rId2"/>
+          <a:stretch/>
+        </p:blipFill>
+        <p:spPr>
+          <a:xfrm>
+            <a:off x="659914" y="1041662"/>
+            <a:ext cx="10872172" cy="2283156"/>
+          </a:xfrm>
+          <a:custGeom>
+            <a:avLst/>
+            <a:gdLst/>
+            <a:ahLst/>
+            <a:cxnLst/>
+            <a:rect l="l" t="t" r="r" b="b"/>
+            <a:pathLst>
+              <a:path w="10580201" h="2957472">
+                <a:moveTo>
+                  <a:pt x="88961" y="0"/>
+                </a:moveTo>
+                <a:lnTo>
+                  <a:pt x="10491240" y="0"/>
+                </a:lnTo>
+                <a:cubicBezTo>
+                  <a:pt x="10540372" y="0"/>
+                  <a:pt x="10580201" y="39829"/>
+                  <a:pt x="10580201" y="88961"/>
+                </a:cubicBezTo>
+                <a:lnTo>
+                  <a:pt x="10580201" y="2868511"/>
+                </a:lnTo>
+                <a:cubicBezTo>
+                  <a:pt x="10580201" y="2917643"/>
+                  <a:pt x="10540372" y="2957472"/>
+                  <a:pt x="10491240" y="2957472"/>
+                </a:cubicBezTo>
+                <a:lnTo>
+                  <a:pt x="88961" y="2957472"/>
+                </a:lnTo>
+                <a:cubicBezTo>
+                  <a:pt x="39829" y="2957472"/>
+                  <a:pt x="0" y="2917643"/>
+                  <a:pt x="0" y="2868511"/>
+                </a:cubicBezTo>
+                <a:lnTo>
+                  <a:pt x="0" y="88961"/>
+                </a:lnTo>
+                <a:cubicBezTo>
+                  <a:pt x="0" y="39829"/>
+                  <a:pt x="39829" y="0"/>
+                  <a:pt x="88961" y="0"/>
+                </a:cubicBezTo>
+                <a:close/>
+              </a:path>
+            </a:pathLst>
+          </a:custGeom>
+        </p:spPr>
+      </p:pic>
       <p:sp>
         <p:nvSpPr>
           <p:cNvPr id="9" name="Content Placeholder 8">
@@ -28744,53 +28786,23 @@
         </p:nvSpPr>
         <p:spPr>
           <a:xfrm>
-            <a:off x="4654295" y="502920"/>
-            <a:ext cx="6894576" cy="1463040"/>
+            <a:off x="4970835" y="3998019"/>
+            <a:ext cx="6382966" cy="2216512"/>
           </a:xfrm>
         </p:spPr>
         <p:txBody>
-          <a:bodyPr anchor="ctr">
+          <a:bodyPr>
             <a:normAutofit/>
           </a:bodyPr>
           <a:lstStyle/>
           <a:p>
             <a:r>
-              <a:rPr lang="en-US" sz="2200" dirty="0"/>
-              <a:t>78 % accuracy of classifying subsequences of bear genomes that were not selected to be in the training data.</a:t>
+              <a:rPr lang="en-US" dirty="0"/>
+              <a:t>46 % accuracy of classifying subsequences of bear genomes that were not selected to be in the training data.</a:t>
             </a:r>
           </a:p>
         </p:txBody>
       </p:sp>
-      <p:pic>
-        <p:nvPicPr>
-          <p:cNvPr id="5" name="Content Placeholder 4" descr="Text&#10;&#10;Description automatically generated">
-            <a:extLst>
-              <a:ext uri="{FF2B5EF4-FFF2-40B4-BE49-F238E27FC236}">
-                <a16:creationId xmlns:a16="http://schemas.microsoft.com/office/drawing/2014/main" id="{E35AA71B-3F83-D112-CF89-6169B6B9B45F}"/>
-              </a:ext>
-            </a:extLst>
-          </p:cNvPr>
-          <p:cNvPicPr>
-            <a:picLocks noChangeAspect="1"/>
-          </p:cNvPicPr>
-          <p:nvPr/>
-        </p:nvPicPr>
-        <p:blipFill>
-          <a:blip r:embed="rId2"/>
-          <a:stretch>
-            <a:fillRect/>
-          </a:stretch>
-        </p:blipFill>
-        <p:spPr>
-          <a:xfrm>
-            <a:off x="630936" y="2660216"/>
-            <a:ext cx="10917936" cy="3220791"/>
-          </a:xfrm>
-          <a:prstGeom prst="rect">
-            <a:avLst/>
-          </a:prstGeom>
-        </p:spPr>
-      </p:pic>
     </p:spTree>
     <p:extLst>
       <p:ext uri="{BB962C8B-B14F-4D97-AF65-F5344CB8AC3E}">

</xml_diff>